<commit_message>
moved xiaos draft to writeups
</commit_message>
<xml_diff>
--- a/illustrations/2antennae.pptx
+++ b/illustrations/2antennae.pptx
@@ -288,7 +288,7 @@
           <a:p>
             <a:fld id="{14FBEC8E-AC55-4B42-81BA-7BC5BAFC6597}" type="datetimeFigureOut">
               <a:rPr lang="en-US" smtClean="0"/>
-              <a:t>11/21/14</a:t>
+              <a:t>2/2/16</a:t>
             </a:fld>
             <a:endParaRPr lang="en-US"/>
           </a:p>
@@ -458,7 +458,7 @@
           <a:p>
             <a:fld id="{14FBEC8E-AC55-4B42-81BA-7BC5BAFC6597}" type="datetimeFigureOut">
               <a:rPr lang="en-US" smtClean="0"/>
-              <a:t>11/21/14</a:t>
+              <a:t>2/2/16</a:t>
             </a:fld>
             <a:endParaRPr lang="en-US"/>
           </a:p>
@@ -638,7 +638,7 @@
           <a:p>
             <a:fld id="{14FBEC8E-AC55-4B42-81BA-7BC5BAFC6597}" type="datetimeFigureOut">
               <a:rPr lang="en-US" smtClean="0"/>
-              <a:t>11/21/14</a:t>
+              <a:t>2/2/16</a:t>
             </a:fld>
             <a:endParaRPr lang="en-US"/>
           </a:p>
@@ -808,7 +808,7 @@
           <a:p>
             <a:fld id="{14FBEC8E-AC55-4B42-81BA-7BC5BAFC6597}" type="datetimeFigureOut">
               <a:rPr lang="en-US" smtClean="0"/>
-              <a:t>11/21/14</a:t>
+              <a:t>2/2/16</a:t>
             </a:fld>
             <a:endParaRPr lang="en-US"/>
           </a:p>
@@ -1054,7 +1054,7 @@
           <a:p>
             <a:fld id="{14FBEC8E-AC55-4B42-81BA-7BC5BAFC6597}" type="datetimeFigureOut">
               <a:rPr lang="en-US" smtClean="0"/>
-              <a:t>11/21/14</a:t>
+              <a:t>2/2/16</a:t>
             </a:fld>
             <a:endParaRPr lang="en-US"/>
           </a:p>
@@ -1342,7 +1342,7 @@
           <a:p>
             <a:fld id="{14FBEC8E-AC55-4B42-81BA-7BC5BAFC6597}" type="datetimeFigureOut">
               <a:rPr lang="en-US" smtClean="0"/>
-              <a:t>11/21/14</a:t>
+              <a:t>2/2/16</a:t>
             </a:fld>
             <a:endParaRPr lang="en-US"/>
           </a:p>
@@ -1764,7 +1764,7 @@
           <a:p>
             <a:fld id="{14FBEC8E-AC55-4B42-81BA-7BC5BAFC6597}" type="datetimeFigureOut">
               <a:rPr lang="en-US" smtClean="0"/>
-              <a:t>11/21/14</a:t>
+              <a:t>2/2/16</a:t>
             </a:fld>
             <a:endParaRPr lang="en-US"/>
           </a:p>
@@ -1882,7 +1882,7 @@
           <a:p>
             <a:fld id="{14FBEC8E-AC55-4B42-81BA-7BC5BAFC6597}" type="datetimeFigureOut">
               <a:rPr lang="en-US" smtClean="0"/>
-              <a:t>11/21/14</a:t>
+              <a:t>2/2/16</a:t>
             </a:fld>
             <a:endParaRPr lang="en-US"/>
           </a:p>
@@ -1977,7 +1977,7 @@
           <a:p>
             <a:fld id="{14FBEC8E-AC55-4B42-81BA-7BC5BAFC6597}" type="datetimeFigureOut">
               <a:rPr lang="en-US" smtClean="0"/>
-              <a:t>11/21/14</a:t>
+              <a:t>2/2/16</a:t>
             </a:fld>
             <a:endParaRPr lang="en-US"/>
           </a:p>
@@ -2254,7 +2254,7 @@
           <a:p>
             <a:fld id="{14FBEC8E-AC55-4B42-81BA-7BC5BAFC6597}" type="datetimeFigureOut">
               <a:rPr lang="en-US" smtClean="0"/>
-              <a:t>11/21/14</a:t>
+              <a:t>2/2/16</a:t>
             </a:fld>
             <a:endParaRPr lang="en-US"/>
           </a:p>
@@ -2507,7 +2507,7 @@
           <a:p>
             <a:fld id="{14FBEC8E-AC55-4B42-81BA-7BC5BAFC6597}" type="datetimeFigureOut">
               <a:rPr lang="en-US" smtClean="0"/>
-              <a:t>11/21/14</a:t>
+              <a:t>2/2/16</a:t>
             </a:fld>
             <a:endParaRPr lang="en-US"/>
           </a:p>
@@ -2720,7 +2720,7 @@
           <a:p>
             <a:fld id="{14FBEC8E-AC55-4B42-81BA-7BC5BAFC6597}" type="datetimeFigureOut">
               <a:rPr lang="en-US" smtClean="0"/>
-              <a:t>11/21/14</a:t>
+              <a:t>2/2/16</a:t>
             </a:fld>
             <a:endParaRPr lang="en-US"/>
           </a:p>
@@ -3117,7 +3117,7 @@
           <a:graphicData uri="http://schemas.openxmlformats.org/presentationml/2006/ole">
             <mc:AlternateContent xmlns:mc="http://schemas.openxmlformats.org/markup-compatibility/2006">
               <mc:Choice xmlns:v="urn:schemas-microsoft-com:vml" Requires="v">
-                <p:oleObj spid="_x0000_s2083" name="Equation" r:id="rId3" imgW="127000" imgH="190500" progId="Equation.DSMT4">
+                <p:oleObj spid="_x0000_s2115" name="Equation" r:id="rId3" imgW="127000" imgH="190500" progId="Equation.DSMT4">
                   <p:embed/>
                 </p:oleObj>
               </mc:Choice>
@@ -3724,6 +3724,7 @@
               </a:solidFill>
               <a:prstDash val="sysDash"/>
             </a:ln>
+            <a:effectLst/>
           </p:spPr>
           <p:style>
             <a:lnRef idx="1">
@@ -3770,7 +3771,7 @@
             <a:graphicData uri="http://schemas.openxmlformats.org/presentationml/2006/ole">
               <mc:AlternateContent xmlns:mc="http://schemas.openxmlformats.org/markup-compatibility/2006">
                 <mc:Choice xmlns:v="urn:schemas-microsoft-com:vml" Requires="v">
-                  <p:oleObj spid="_x0000_s2084" name="Equation" r:id="rId5" imgW="215900" imgH="203200" progId="Equation.DSMT4">
+                  <p:oleObj spid="_x0000_s2116" name="Equation" r:id="rId5" imgW="215900" imgH="203200" progId="Equation.DSMT4">
                     <p:embed/>
                   </p:oleObj>
                 </mc:Choice>
@@ -3828,7 +3829,7 @@
           <a:graphicData uri="http://schemas.openxmlformats.org/presentationml/2006/ole">
             <mc:AlternateContent xmlns:mc="http://schemas.openxmlformats.org/markup-compatibility/2006">
               <mc:Choice xmlns:v="urn:schemas-microsoft-com:vml" Requires="v">
-                <p:oleObj spid="_x0000_s2085" name="Equation" r:id="rId7" imgW="177800" imgH="203200" progId="Equation.DSMT4">
+                <p:oleObj spid="_x0000_s2117" name="Equation" r:id="rId7" imgW="177800" imgH="203200" progId="Equation.DSMT4">
                   <p:embed/>
                 </p:oleObj>
               </mc:Choice>
@@ -3885,7 +3886,7 @@
           <a:graphicData uri="http://schemas.openxmlformats.org/presentationml/2006/ole">
             <mc:AlternateContent xmlns:mc="http://schemas.openxmlformats.org/markup-compatibility/2006">
               <mc:Choice xmlns:v="urn:schemas-microsoft-com:vml" Requires="v">
-                <p:oleObj spid="_x0000_s2086" name="Equation" r:id="rId9" imgW="190500" imgH="228600" progId="Equation.DSMT4">
+                <p:oleObj spid="_x0000_s2118" name="Equation" r:id="rId9" imgW="190500" imgH="228600" progId="Equation.DSMT4">
                   <p:embed/>
                 </p:oleObj>
               </mc:Choice>
@@ -3920,115 +3921,43 @@
           </a:graphicData>
         </a:graphic>
       </p:graphicFrame>
-      <p:grpSp>
-        <p:nvGrpSpPr>
-          <p:cNvPr id="41" name="Group 40"/>
-          <p:cNvGrpSpPr/>
+      <p:cxnSp>
+        <p:nvCxnSpPr>
+          <p:cNvPr id="43" name="Straight Arrow Connector 42"/>
+          <p:cNvCxnSpPr/>
           <p:nvPr/>
-        </p:nvGrpSpPr>
-        <p:grpSpPr>
-          <a:xfrm>
-            <a:off x="7471240" y="576423"/>
-            <a:ext cx="1082456" cy="1107213"/>
-            <a:chOff x="2684682" y="469900"/>
-            <a:chExt cx="1082456" cy="1107213"/>
+        </p:nvCxnSpPr>
+        <p:spPr>
+          <a:xfrm flipV="1">
+            <a:off x="7471240" y="874144"/>
+            <a:ext cx="562308" cy="809492"/>
           </a:xfrm>
-        </p:grpSpPr>
-        <p:cxnSp>
-          <p:nvCxnSpPr>
-            <p:cNvPr id="43" name="Straight Arrow Connector 42"/>
-            <p:cNvCxnSpPr/>
-            <p:nvPr/>
-          </p:nvCxnSpPr>
-          <p:spPr>
-            <a:xfrm flipV="1">
-              <a:off x="2684682" y="767621"/>
-              <a:ext cx="562308" cy="809492"/>
-            </a:xfrm>
-            <a:prstGeom prst="straightConnector1">
-              <a:avLst/>
-            </a:prstGeom>
-            <a:ln w="31750">
-              <a:solidFill>
-                <a:schemeClr val="tx1"/>
-              </a:solidFill>
-              <a:tailEnd type="arrow" w="lg" len="lg"/>
-            </a:ln>
-            <a:effectLst/>
-          </p:spPr>
-          <p:style>
-            <a:lnRef idx="2">
-              <a:schemeClr val="accent1"/>
-            </a:lnRef>
-            <a:fillRef idx="0">
-              <a:schemeClr val="accent1"/>
-            </a:fillRef>
-            <a:effectRef idx="1">
-              <a:schemeClr val="accent1"/>
-            </a:effectRef>
-            <a:fontRef idx="minor">
+          <a:prstGeom prst="straightConnector1">
+            <a:avLst/>
+          </a:prstGeom>
+          <a:ln w="31750">
+            <a:solidFill>
               <a:schemeClr val="tx1"/>
-            </a:fontRef>
-          </p:style>
-        </p:cxnSp>
-        <p:graphicFrame>
-          <p:nvGraphicFramePr>
-            <p:cNvPr id="44" name="Object 43"/>
-            <p:cNvGraphicFramePr>
-              <a:graphicFrameLocks noChangeAspect="1"/>
-            </p:cNvGraphicFramePr>
-            <p:nvPr>
-              <p:extLst>
-                <p:ext uri="{D42A27DB-BD31-4B8C-83A1-F6EECF244321}">
-                  <p14:modId xmlns:p14="http://schemas.microsoft.com/office/powerpoint/2010/main" val="2047899609"/>
-                </p:ext>
-              </p:extLst>
-            </p:nvPr>
-          </p:nvGraphicFramePr>
-          <p:xfrm>
-            <a:off x="3332163" y="469900"/>
-            <a:ext cx="434975" cy="622300"/>
-          </p:xfrm>
-          <a:graphic>
-            <a:graphicData uri="http://schemas.openxmlformats.org/presentationml/2006/ole">
-              <mc:AlternateContent xmlns:mc="http://schemas.openxmlformats.org/markup-compatibility/2006">
-                <mc:Choice xmlns:v="urn:schemas-microsoft-com:vml" Requires="v">
-                  <p:oleObj spid="_x0000_s2087" name="Equation" r:id="rId11" imgW="139700" imgH="203200" progId="Equation.DSMT4">
-                    <p:embed/>
-                  </p:oleObj>
-                </mc:Choice>
-                <mc:Fallback>
-                  <p:oleObj name="Equation" r:id="rId11" imgW="139700" imgH="203200" progId="Equation.DSMT4">
-                    <p:embed/>
-                    <p:pic>
-                      <p:nvPicPr>
-                        <p:cNvPr id="0" name=""/>
-                        <p:cNvPicPr/>
-                        <p:nvPr/>
-                      </p:nvPicPr>
-                      <p:blipFill>
-                        <a:blip r:embed="rId12"/>
-                        <a:stretch>
-                          <a:fillRect/>
-                        </a:stretch>
-                      </p:blipFill>
-                      <p:spPr>
-                        <a:xfrm>
-                          <a:off x="3332163" y="469900"/>
-                          <a:ext cx="434975" cy="622300"/>
-                        </a:xfrm>
-                        <a:prstGeom prst="rect">
-                          <a:avLst/>
-                        </a:prstGeom>
-                      </p:spPr>
-                    </p:pic>
-                  </p:oleObj>
-                </mc:Fallback>
-              </mc:AlternateContent>
-            </a:graphicData>
-          </a:graphic>
-        </p:graphicFrame>
-      </p:grpSp>
+            </a:solidFill>
+            <a:tailEnd type="arrow" w="lg" len="lg"/>
+          </a:ln>
+          <a:effectLst/>
+        </p:spPr>
+        <p:style>
+          <a:lnRef idx="2">
+            <a:schemeClr val="accent1"/>
+          </a:lnRef>
+          <a:fillRef idx="0">
+            <a:schemeClr val="accent1"/>
+          </a:fillRef>
+          <a:effectRef idx="1">
+            <a:schemeClr val="accent1"/>
+          </a:effectRef>
+          <a:fontRef idx="minor">
+            <a:schemeClr val="tx1"/>
+          </a:fontRef>
+        </p:style>
+      </p:cxnSp>
       <p:cxnSp>
         <p:nvCxnSpPr>
           <p:cNvPr id="4" name="Straight Connector 3"/>
@@ -4146,51 +4075,6 @@
           </a:fontRef>
         </p:style>
       </p:cxnSp>
-      <p:sp>
-        <p:nvSpPr>
-          <p:cNvPr id="56" name="Arc 55"/>
-          <p:cNvSpPr/>
-          <p:nvPr/>
-        </p:nvSpPr>
-        <p:spPr>
-          <a:xfrm rot="15056556">
-            <a:off x="4198684" y="2097478"/>
-            <a:ext cx="1643197" cy="1150782"/>
-          </a:xfrm>
-          <a:prstGeom prst="arc">
-            <a:avLst/>
-          </a:prstGeom>
-          <a:ln w="22225">
-            <a:solidFill>
-              <a:schemeClr val="tx1"/>
-            </a:solidFill>
-            <a:prstDash val="sysDash"/>
-          </a:ln>
-          <a:effectLst/>
-        </p:spPr>
-        <p:style>
-          <a:lnRef idx="2">
-            <a:schemeClr val="accent1"/>
-          </a:lnRef>
-          <a:fillRef idx="0">
-            <a:schemeClr val="accent1"/>
-          </a:fillRef>
-          <a:effectRef idx="1">
-            <a:schemeClr val="accent1"/>
-          </a:effectRef>
-          <a:fontRef idx="minor">
-            <a:schemeClr val="tx1"/>
-          </a:fontRef>
-        </p:style>
-        <p:txBody>
-          <a:bodyPr rtlCol="0" anchor="ctr"/>
-          <a:lstStyle/>
-          <a:p>
-            <a:pPr algn="ctr"/>
-            <a:endParaRPr lang="en-US"/>
-          </a:p>
-        </p:txBody>
-      </p:sp>
       <p:graphicFrame>
         <p:nvGraphicFramePr>
           <p:cNvPr id="79" name="Object 78"/>
@@ -4200,25 +4084,25 @@
           <p:nvPr>
             <p:extLst>
               <p:ext uri="{D42A27DB-BD31-4B8C-83A1-F6EECF244321}">
-                <p14:modId xmlns:p14="http://schemas.microsoft.com/office/powerpoint/2010/main" val="3543791874"/>
+                <p14:modId xmlns:p14="http://schemas.microsoft.com/office/powerpoint/2010/main" val="1299411508"/>
               </p:ext>
             </p:extLst>
           </p:nvPr>
         </p:nvGraphicFramePr>
         <p:xfrm>
-          <a:off x="1077318" y="1061336"/>
-          <a:ext cx="912813" cy="622300"/>
+          <a:off x="1096963" y="1081088"/>
+          <a:ext cx="873125" cy="584200"/>
         </p:xfrm>
         <a:graphic>
           <a:graphicData uri="http://schemas.openxmlformats.org/presentationml/2006/ole">
             <mc:AlternateContent xmlns:mc="http://schemas.openxmlformats.org/markup-compatibility/2006">
               <mc:Choice xmlns:v="urn:schemas-microsoft-com:vml" Requires="v">
-                <p:oleObj spid="_x0000_s2088" name="Equation" r:id="rId13" imgW="292100" imgH="203200" progId="Equation.DSMT4">
+                <p:oleObj spid="_x0000_s2119" name="Equation" r:id="rId11" imgW="279400" imgH="190500" progId="Equation.DSMT4">
                   <p:embed/>
                 </p:oleObj>
               </mc:Choice>
               <mc:Fallback>
-                <p:oleObj name="Equation" r:id="rId13" imgW="292100" imgH="203200" progId="Equation.DSMT4">
+                <p:oleObj name="Equation" r:id="rId11" imgW="279400" imgH="190500" progId="Equation.DSMT4">
                   <p:embed/>
                   <p:pic>
                     <p:nvPicPr>
@@ -4227,15 +4111,15 @@
                       <p:nvPr/>
                     </p:nvPicPr>
                     <p:blipFill>
-                      <a:blip r:embed="rId14"/>
+                      <a:blip r:embed="rId12"/>
                       <a:stretch>
                         <a:fillRect/>
                       </a:stretch>
                     </p:blipFill>
                     <p:spPr>
                       <a:xfrm>
-                        <a:off x="1077318" y="1061336"/>
-                        <a:ext cx="912813" cy="622300"/>
+                        <a:off x="1096963" y="1081088"/>
+                        <a:ext cx="873125" cy="584200"/>
                       </a:xfrm>
                       <a:prstGeom prst="rect">
                         <a:avLst/>
@@ -4292,63 +4176,6 @@
           </a:p>
         </p:txBody>
       </p:sp>
-      <p:graphicFrame>
-        <p:nvGraphicFramePr>
-          <p:cNvPr id="82" name="Object 81"/>
-          <p:cNvGraphicFramePr>
-            <a:graphicFrameLocks noChangeAspect="1"/>
-          </p:cNvGraphicFramePr>
-          <p:nvPr>
-            <p:extLst>
-              <p:ext uri="{D42A27DB-BD31-4B8C-83A1-F6EECF244321}">
-                <p14:modId xmlns:p14="http://schemas.microsoft.com/office/powerpoint/2010/main" val="464884446"/>
-              </p:ext>
-            </p:extLst>
-          </p:nvPr>
-        </p:nvGraphicFramePr>
-        <p:xfrm>
-          <a:off x="4537463" y="2363275"/>
-          <a:ext cx="1097410" cy="317349"/>
-        </p:xfrm>
-        <a:graphic>
-          <a:graphicData uri="http://schemas.openxmlformats.org/presentationml/2006/ole">
-            <mc:AlternateContent xmlns:mc="http://schemas.openxmlformats.org/markup-compatibility/2006">
-              <mc:Choice xmlns:v="urn:schemas-microsoft-com:vml" Requires="v">
-                <p:oleObj spid="_x0000_s2089" name="Equation" r:id="rId15" imgW="774700" imgH="228600" progId="Equation.DSMT4">
-                  <p:embed/>
-                </p:oleObj>
-              </mc:Choice>
-              <mc:Fallback>
-                <p:oleObj name="Equation" r:id="rId15" imgW="774700" imgH="228600" progId="Equation.DSMT4">
-                  <p:embed/>
-                  <p:pic>
-                    <p:nvPicPr>
-                      <p:cNvPr id="0" name=""/>
-                      <p:cNvPicPr/>
-                      <p:nvPr/>
-                    </p:nvPicPr>
-                    <p:blipFill>
-                      <a:blip r:embed="rId16"/>
-                      <a:stretch>
-                        <a:fillRect/>
-                      </a:stretch>
-                    </p:blipFill>
-                    <p:spPr>
-                      <a:xfrm>
-                        <a:off x="4537463" y="2363275"/>
-                        <a:ext cx="1097410" cy="317349"/>
-                      </a:xfrm>
-                      <a:prstGeom prst="rect">
-                        <a:avLst/>
-                      </a:prstGeom>
-                    </p:spPr>
-                  </p:pic>
-                </p:oleObj>
-              </mc:Fallback>
-            </mc:AlternateContent>
-          </a:graphicData>
-        </a:graphic>
-      </p:graphicFrame>
       <p:grpSp>
         <p:nvGrpSpPr>
           <p:cNvPr id="83" name="Group 82"/>
@@ -4357,10 +4184,10 @@
         </p:nvGrpSpPr>
         <p:grpSpPr>
           <a:xfrm>
-            <a:off x="4645582" y="682157"/>
-            <a:ext cx="1082456" cy="1107213"/>
-            <a:chOff x="2684682" y="469900"/>
-            <a:chExt cx="1082456" cy="1107213"/>
+            <a:off x="4645582" y="760942"/>
+            <a:ext cx="997980" cy="1028428"/>
+            <a:chOff x="2684682" y="548685"/>
+            <a:chExt cx="997980" cy="1028428"/>
           </a:xfrm>
         </p:grpSpPr>
         <p:cxnSp>
@@ -4409,25 +4236,25 @@
             <p:nvPr>
               <p:extLst>
                 <p:ext uri="{D42A27DB-BD31-4B8C-83A1-F6EECF244321}">
-                  <p14:modId xmlns:p14="http://schemas.microsoft.com/office/powerpoint/2010/main" val="2064230588"/>
+                  <p14:modId xmlns:p14="http://schemas.microsoft.com/office/powerpoint/2010/main" val="1991519753"/>
                 </p:ext>
               </p:extLst>
             </p:nvPr>
           </p:nvGraphicFramePr>
           <p:xfrm>
-            <a:off x="3332163" y="469900"/>
-            <a:ext cx="434975" cy="622300"/>
+            <a:off x="3287374" y="548685"/>
+            <a:ext cx="395288" cy="506413"/>
           </p:xfrm>
           <a:graphic>
             <a:graphicData uri="http://schemas.openxmlformats.org/presentationml/2006/ole">
               <mc:AlternateContent xmlns:mc="http://schemas.openxmlformats.org/markup-compatibility/2006">
                 <mc:Choice xmlns:v="urn:schemas-microsoft-com:vml" Requires="v">
-                  <p:oleObj spid="_x0000_s2090" name="Equation" r:id="rId17" imgW="139700" imgH="203200" progId="Equation.DSMT4">
+                  <p:oleObj spid="_x0000_s2120" name="Equation" r:id="rId13" imgW="127000" imgH="165100" progId="Equation.DSMT4">
                     <p:embed/>
                   </p:oleObj>
                 </mc:Choice>
                 <mc:Fallback>
-                  <p:oleObj name="Equation" r:id="rId17" imgW="139700" imgH="203200" progId="Equation.DSMT4">
+                  <p:oleObj name="Equation" r:id="rId13" imgW="127000" imgH="165100" progId="Equation.DSMT4">
                     <p:embed/>
                     <p:pic>
                       <p:nvPicPr>
@@ -4436,15 +4263,15 @@
                         <p:nvPr/>
                       </p:nvPicPr>
                       <p:blipFill>
-                        <a:blip r:embed="rId12"/>
+                        <a:blip r:embed="rId14"/>
                         <a:stretch>
                           <a:fillRect/>
                         </a:stretch>
                       </p:blipFill>
                       <p:spPr>
                         <a:xfrm>
-                          <a:off x="3332163" y="469900"/>
-                          <a:ext cx="434975" cy="622300"/>
+                          <a:off x="3287374" y="548685"/>
+                          <a:ext cx="395288" cy="506413"/>
                         </a:xfrm>
                         <a:prstGeom prst="rect">
                           <a:avLst/>
@@ -4476,7 +4303,7 @@
             <a:solidFill>
               <a:schemeClr val="tx1"/>
             </a:solidFill>
-            <a:headEnd type="oval"/>
+            <a:headEnd type="arrow" w="lg" len="lg"/>
             <a:tailEnd type="arrow" w="lg" len="lg"/>
           </a:ln>
           <a:effectLst/>
@@ -4496,6 +4323,237 @@
           </a:fontRef>
         </p:style>
       </p:cxnSp>
+      <p:graphicFrame>
+        <p:nvGraphicFramePr>
+          <p:cNvPr id="40" name="Object 39"/>
+          <p:cNvGraphicFramePr>
+            <a:graphicFrameLocks noChangeAspect="1"/>
+          </p:cNvGraphicFramePr>
+          <p:nvPr>
+            <p:extLst>
+              <p:ext uri="{D42A27DB-BD31-4B8C-83A1-F6EECF244321}">
+                <p14:modId xmlns:p14="http://schemas.microsoft.com/office/powerpoint/2010/main" val="3587684124"/>
+              </p:ext>
+            </p:extLst>
+          </p:nvPr>
+        </p:nvGraphicFramePr>
+        <p:xfrm>
+          <a:off x="8099022" y="737130"/>
+          <a:ext cx="395288" cy="506413"/>
+        </p:xfrm>
+        <a:graphic>
+          <a:graphicData uri="http://schemas.openxmlformats.org/presentationml/2006/ole">
+            <mc:AlternateContent xmlns:mc="http://schemas.openxmlformats.org/markup-compatibility/2006">
+              <mc:Choice xmlns:v="urn:schemas-microsoft-com:vml" Requires="v">
+                <p:oleObj spid="_x0000_s2121" name="Equation" r:id="rId15" imgW="127000" imgH="165100" progId="Equation.DSMT4">
+                  <p:embed/>
+                </p:oleObj>
+              </mc:Choice>
+              <mc:Fallback>
+                <p:oleObj name="Equation" r:id="rId15" imgW="127000" imgH="165100" progId="Equation.DSMT4">
+                  <p:embed/>
+                  <p:pic>
+                    <p:nvPicPr>
+                      <p:cNvPr id="0" name=""/>
+                      <p:cNvPicPr/>
+                      <p:nvPr/>
+                    </p:nvPicPr>
+                    <p:blipFill>
+                      <a:blip r:embed="rId14"/>
+                      <a:stretch>
+                        <a:fillRect/>
+                      </a:stretch>
+                    </p:blipFill>
+                    <p:spPr>
+                      <a:xfrm>
+                        <a:off x="8099022" y="737130"/>
+                        <a:ext cx="395288" cy="506413"/>
+                      </a:xfrm>
+                      <a:prstGeom prst="rect">
+                        <a:avLst/>
+                      </a:prstGeom>
+                    </p:spPr>
+                  </p:pic>
+                </p:oleObj>
+              </mc:Fallback>
+            </mc:AlternateContent>
+          </a:graphicData>
+        </a:graphic>
+      </p:graphicFrame>
+      <p:grpSp>
+        <p:nvGrpSpPr>
+          <p:cNvPr id="15" name="Group 14"/>
+          <p:cNvGrpSpPr/>
+          <p:nvPr/>
+        </p:nvGrpSpPr>
+        <p:grpSpPr>
+          <a:xfrm rot="1993210">
+            <a:off x="4937604" y="1529933"/>
+            <a:ext cx="286099" cy="270710"/>
+            <a:chOff x="8029092" y="5782956"/>
+            <a:chExt cx="460762" cy="423333"/>
+          </a:xfrm>
+        </p:grpSpPr>
+        <p:cxnSp>
+          <p:nvCxnSpPr>
+            <p:cNvPr id="7" name="Straight Connector 6"/>
+            <p:cNvCxnSpPr/>
+            <p:nvPr/>
+          </p:nvCxnSpPr>
+          <p:spPr>
+            <a:xfrm>
+              <a:off x="8046916" y="5782956"/>
+              <a:ext cx="0" cy="423333"/>
+            </a:xfrm>
+            <a:prstGeom prst="line">
+              <a:avLst/>
+            </a:prstGeom>
+            <a:ln w="38100">
+              <a:solidFill>
+                <a:schemeClr val="tx1"/>
+              </a:solidFill>
+            </a:ln>
+            <a:effectLst/>
+          </p:spPr>
+          <p:style>
+            <a:lnRef idx="2">
+              <a:schemeClr val="accent1"/>
+            </a:lnRef>
+            <a:fillRef idx="0">
+              <a:schemeClr val="accent1"/>
+            </a:fillRef>
+            <a:effectRef idx="1">
+              <a:schemeClr val="accent1"/>
+            </a:effectRef>
+            <a:fontRef idx="minor">
+              <a:schemeClr val="tx1"/>
+            </a:fontRef>
+          </p:style>
+        </p:cxnSp>
+        <p:cxnSp>
+          <p:nvCxnSpPr>
+            <p:cNvPr id="45" name="Straight Connector 44"/>
+            <p:cNvCxnSpPr/>
+            <p:nvPr/>
+          </p:nvCxnSpPr>
+          <p:spPr>
+            <a:xfrm flipH="1">
+              <a:off x="8029092" y="6197377"/>
+              <a:ext cx="460762" cy="0"/>
+            </a:xfrm>
+            <a:prstGeom prst="line">
+              <a:avLst/>
+            </a:prstGeom>
+            <a:ln w="38100">
+              <a:solidFill>
+                <a:schemeClr val="tx1"/>
+              </a:solidFill>
+            </a:ln>
+            <a:effectLst/>
+          </p:spPr>
+          <p:style>
+            <a:lnRef idx="2">
+              <a:schemeClr val="accent1"/>
+            </a:lnRef>
+            <a:fillRef idx="0">
+              <a:schemeClr val="accent1"/>
+            </a:fillRef>
+            <a:effectRef idx="1">
+              <a:schemeClr val="accent1"/>
+            </a:effectRef>
+            <a:fontRef idx="minor">
+              <a:schemeClr val="tx1"/>
+            </a:fontRef>
+          </p:style>
+        </p:cxnSp>
+      </p:grpSp>
+      <p:grpSp>
+        <p:nvGrpSpPr>
+          <p:cNvPr id="52" name="Group 51"/>
+          <p:cNvGrpSpPr/>
+          <p:nvPr/>
+        </p:nvGrpSpPr>
+        <p:grpSpPr>
+          <a:xfrm rot="7321480">
+            <a:off x="3150787" y="1216515"/>
+            <a:ext cx="286099" cy="270710"/>
+            <a:chOff x="8029092" y="5782956"/>
+            <a:chExt cx="460762" cy="423333"/>
+          </a:xfrm>
+        </p:grpSpPr>
+        <p:cxnSp>
+          <p:nvCxnSpPr>
+            <p:cNvPr id="53" name="Straight Connector 52"/>
+            <p:cNvCxnSpPr/>
+            <p:nvPr/>
+          </p:nvCxnSpPr>
+          <p:spPr>
+            <a:xfrm>
+              <a:off x="8046916" y="5782956"/>
+              <a:ext cx="0" cy="423333"/>
+            </a:xfrm>
+            <a:prstGeom prst="line">
+              <a:avLst/>
+            </a:prstGeom>
+            <a:ln w="38100">
+              <a:solidFill>
+                <a:schemeClr val="tx1"/>
+              </a:solidFill>
+            </a:ln>
+            <a:effectLst/>
+          </p:spPr>
+          <p:style>
+            <a:lnRef idx="2">
+              <a:schemeClr val="accent1"/>
+            </a:lnRef>
+            <a:fillRef idx="0">
+              <a:schemeClr val="accent1"/>
+            </a:fillRef>
+            <a:effectRef idx="1">
+              <a:schemeClr val="accent1"/>
+            </a:effectRef>
+            <a:fontRef idx="minor">
+              <a:schemeClr val="tx1"/>
+            </a:fontRef>
+          </p:style>
+        </p:cxnSp>
+        <p:cxnSp>
+          <p:nvCxnSpPr>
+            <p:cNvPr id="55" name="Straight Connector 54"/>
+            <p:cNvCxnSpPr/>
+            <p:nvPr/>
+          </p:nvCxnSpPr>
+          <p:spPr>
+            <a:xfrm flipH="1">
+              <a:off x="8029092" y="6197377"/>
+              <a:ext cx="460762" cy="0"/>
+            </a:xfrm>
+            <a:prstGeom prst="line">
+              <a:avLst/>
+            </a:prstGeom>
+            <a:ln w="38100">
+              <a:solidFill>
+                <a:schemeClr val="tx1"/>
+              </a:solidFill>
+            </a:ln>
+            <a:effectLst/>
+          </p:spPr>
+          <p:style>
+            <a:lnRef idx="2">
+              <a:schemeClr val="accent1"/>
+            </a:lnRef>
+            <a:fillRef idx="0">
+              <a:schemeClr val="accent1"/>
+            </a:fillRef>
+            <a:effectRef idx="1">
+              <a:schemeClr val="accent1"/>
+            </a:effectRef>
+            <a:fontRef idx="minor">
+              <a:schemeClr val="tx1"/>
+            </a:fontRef>
+          </p:style>
+        </p:cxnSp>
+      </p:grpSp>
     </p:spTree>
     <p:extLst>
       <p:ext uri="{BB962C8B-B14F-4D97-AF65-F5344CB8AC3E}">

</xml_diff>